<commit_message>
agregue 2 imagenes a la vista de compra
</commit_message>
<xml_diff>
--- a/WireFrame/WireFrame de Digital House.pptx
+++ b/WireFrame/WireFrame de Digital House.pptx
@@ -3181,8 +3181,8 @@
         </p:nvSpPr>
         <p:spPr>
           <a:xfrm>
-            <a:off x="4555622" y="3341342"/>
-            <a:ext cx="3000659" cy="597349"/>
+            <a:off x="4557386" y="3113713"/>
+            <a:ext cx="1512063" cy="597349"/>
           </a:xfrm>
           <a:prstGeom prst="rect">
             <a:avLst/>
@@ -3214,9 +3214,21 @@
           <a:p>
             <a:pPr algn="ctr"/>
             <a:r>
-              <a:rPr lang="es-ES" sz="1400" dirty="0" smtClean="0"/>
-              <a:t>Nombre del Articulo</a:t>
-            </a:r>
+              <a:rPr lang="es-ES" sz="1200" dirty="0" smtClean="0"/>
+              <a:t>Nombre del </a:t>
+            </a:r>
+            <a:r>
+              <a:rPr lang="es-ES" sz="1200" dirty="0" smtClean="0"/>
+              <a:t>Articulo</a:t>
+            </a:r>
+            <a:br>
+              <a:rPr lang="es-ES" sz="1200" dirty="0" smtClean="0"/>
+            </a:br>
+            <a:r>
+              <a:rPr lang="es-ES" sz="1200" dirty="0" smtClean="0"/>
+              <a:t>Categoría</a:t>
+            </a:r>
+            <a:endParaRPr lang="es-ES" sz="1200" dirty="0" smtClean="0"/>
           </a:p>
           <a:p>
             <a:pPr algn="ctr"/>
@@ -3301,11 +3313,7 @@
             <a:pPr algn="ctr"/>
             <a:r>
               <a:rPr lang="es-ES" dirty="0" smtClean="0"/>
-              <a:t>Logo </a:t>
-            </a:r>
-            <a:r>
-              <a:rPr lang="es-ES" dirty="0" smtClean="0"/>
-              <a:t>Marca</a:t>
+              <a:t>Logo Marca</a:t>
             </a:r>
           </a:p>
           <a:p>
@@ -3567,8 +3575,478 @@
         </p:nvSpPr>
         <p:spPr>
           <a:xfrm>
-            <a:off x="883686" y="4643512"/>
-            <a:ext cx="3083279" cy="1520259"/>
+            <a:off x="883687" y="4643512"/>
+            <a:ext cx="1540800" cy="1520259"/>
+          </a:xfrm>
+          <a:prstGeom prst="rect">
+            <a:avLst/>
+          </a:prstGeom>
+        </p:spPr>
+        <p:style>
+          <a:lnRef idx="2">
+            <a:schemeClr val="dk1"/>
+          </a:lnRef>
+          <a:fillRef idx="1">
+            <a:schemeClr val="lt1"/>
+          </a:fillRef>
+          <a:effectRef idx="0">
+            <a:schemeClr val="dk1"/>
+          </a:effectRef>
+          <a:fontRef idx="minor">
+            <a:schemeClr val="dk1"/>
+          </a:fontRef>
+        </p:style>
+        <p:txBody>
+          <a:bodyPr rtlCol="0" anchor="ctr"/>
+          <a:lstStyle/>
+          <a:p>
+            <a:pPr algn="ctr"/>
+            <a:r>
+              <a:rPr lang="es-ES" dirty="0">
+                <a:solidFill>
+                  <a:schemeClr val="dk1"/>
+                </a:solidFill>
+              </a:rPr>
+              <a:t>Imagen </a:t>
+            </a:r>
+            <a:r>
+              <a:rPr lang="es-ES" dirty="0" smtClean="0">
+                <a:solidFill>
+                  <a:schemeClr val="dk1"/>
+                </a:solidFill>
+              </a:rPr>
+              <a:t>articulo</a:t>
+            </a:r>
+          </a:p>
+          <a:p>
+            <a:pPr algn="ctr"/>
+            <a:r>
+              <a:rPr lang="es-ES" sz="1200" dirty="0" smtClean="0"/>
+              <a:t>40% ancho total</a:t>
+            </a:r>
+          </a:p>
+        </p:txBody>
+      </p:sp>
+      <p:sp>
+        <p:nvSpPr>
+          <p:cNvPr id="24" name="CuadroTexto 23"/>
+          <p:cNvSpPr txBox="1"/>
+          <p:nvPr/>
+        </p:nvSpPr>
+        <p:spPr>
+          <a:xfrm>
+            <a:off x="1379077" y="4274179"/>
+            <a:ext cx="2092496" cy="369332"/>
+          </a:xfrm>
+          <a:prstGeom prst="rect">
+            <a:avLst/>
+          </a:prstGeom>
+          <a:noFill/>
+        </p:spPr>
+        <p:txBody>
+          <a:bodyPr wrap="none" rtlCol="0">
+            <a:spAutoFit/>
+          </a:bodyPr>
+          <a:lstStyle/>
+          <a:p>
+            <a:r>
+              <a:rPr lang="es-ES" dirty="0" smtClean="0"/>
+              <a:t>Destacados para vos</a:t>
+            </a:r>
+            <a:endParaRPr lang="es-ES" dirty="0"/>
+          </a:p>
+        </p:txBody>
+      </p:sp>
+      <p:sp>
+        <p:nvSpPr>
+          <p:cNvPr id="25" name="CuadroTexto 24"/>
+          <p:cNvSpPr txBox="1"/>
+          <p:nvPr/>
+        </p:nvSpPr>
+        <p:spPr>
+          <a:xfrm>
+            <a:off x="883686" y="6163772"/>
+            <a:ext cx="1696250" cy="312892"/>
+          </a:xfrm>
+          <a:prstGeom prst="rect">
+            <a:avLst/>
+          </a:prstGeom>
+          <a:noFill/>
+        </p:spPr>
+        <p:txBody>
+          <a:bodyPr wrap="square" rtlCol="0">
+            <a:spAutoFit/>
+          </a:bodyPr>
+          <a:lstStyle/>
+          <a:p>
+            <a:pPr algn="ctr"/>
+            <a:r>
+              <a:rPr lang="es-ES" sz="1400" dirty="0" smtClean="0"/>
+              <a:t>Nombre Articulo</a:t>
+            </a:r>
+            <a:endParaRPr lang="es-ES" sz="1400" dirty="0"/>
+          </a:p>
+        </p:txBody>
+      </p:sp>
+      <p:sp>
+        <p:nvSpPr>
+          <p:cNvPr id="46" name="Rectángulo 45"/>
+          <p:cNvSpPr/>
+          <p:nvPr/>
+        </p:nvSpPr>
+        <p:spPr>
+          <a:xfrm>
+            <a:off x="8198718" y="5160591"/>
+            <a:ext cx="2460913" cy="340160"/>
+          </a:xfrm>
+          <a:prstGeom prst="rect">
+            <a:avLst/>
+          </a:prstGeom>
+        </p:spPr>
+        <p:style>
+          <a:lnRef idx="2">
+            <a:schemeClr val="dk1"/>
+          </a:lnRef>
+          <a:fillRef idx="1">
+            <a:schemeClr val="lt1"/>
+          </a:fillRef>
+          <a:effectRef idx="0">
+            <a:schemeClr val="dk1"/>
+          </a:effectRef>
+          <a:fontRef idx="minor">
+            <a:schemeClr val="dk1"/>
+          </a:fontRef>
+        </p:style>
+        <p:txBody>
+          <a:bodyPr rtlCol="0" anchor="ctr"/>
+          <a:lstStyle/>
+          <a:p>
+            <a:pPr algn="ctr"/>
+            <a:r>
+              <a:rPr lang="es-ES" dirty="0">
+                <a:solidFill>
+                  <a:schemeClr val="dk1"/>
+                </a:solidFill>
+              </a:rPr>
+              <a:t>Ingresa tu email</a:t>
+            </a:r>
+          </a:p>
+        </p:txBody>
+      </p:sp>
+      <p:sp>
+        <p:nvSpPr>
+          <p:cNvPr id="48" name="Rectángulo 47"/>
+          <p:cNvSpPr/>
+          <p:nvPr/>
+        </p:nvSpPr>
+        <p:spPr>
+          <a:xfrm>
+            <a:off x="10758099" y="5160591"/>
+            <a:ext cx="419164" cy="339203"/>
+          </a:xfrm>
+          <a:prstGeom prst="rect">
+            <a:avLst/>
+          </a:prstGeom>
+        </p:spPr>
+        <p:style>
+          <a:lnRef idx="2">
+            <a:schemeClr val="dk1"/>
+          </a:lnRef>
+          <a:fillRef idx="1">
+            <a:schemeClr val="lt1"/>
+          </a:fillRef>
+          <a:effectRef idx="0">
+            <a:schemeClr val="dk1"/>
+          </a:effectRef>
+          <a:fontRef idx="minor">
+            <a:schemeClr val="dk1"/>
+          </a:fontRef>
+        </p:style>
+        <p:txBody>
+          <a:bodyPr rtlCol="0" anchor="ctr"/>
+          <a:lstStyle/>
+          <a:p>
+            <a:pPr algn="ctr"/>
+            <a:r>
+              <a:rPr lang="es-ES" dirty="0">
+                <a:solidFill>
+                  <a:schemeClr val="dk1"/>
+                </a:solidFill>
+              </a:rPr>
+              <a:t>&gt;</a:t>
+            </a:r>
+          </a:p>
+        </p:txBody>
+      </p:sp>
+      <p:sp>
+        <p:nvSpPr>
+          <p:cNvPr id="49" name="CuadroTexto 48"/>
+          <p:cNvSpPr txBox="1"/>
+          <p:nvPr/>
+        </p:nvSpPr>
+        <p:spPr>
+          <a:xfrm>
+            <a:off x="8176603" y="4824677"/>
+            <a:ext cx="3000660" cy="338554"/>
+          </a:xfrm>
+          <a:prstGeom prst="rect">
+            <a:avLst/>
+          </a:prstGeom>
+          <a:noFill/>
+        </p:spPr>
+        <p:txBody>
+          <a:bodyPr wrap="square" rtlCol="0">
+            <a:spAutoFit/>
+          </a:bodyPr>
+          <a:lstStyle/>
+          <a:p>
+            <a:pPr algn="ctr"/>
+            <a:r>
+              <a:rPr lang="es-ES" sz="1600" dirty="0" err="1" smtClean="0"/>
+              <a:t>Newsletter</a:t>
+            </a:r>
+            <a:endParaRPr lang="es-ES" sz="1600" dirty="0"/>
+          </a:p>
+        </p:txBody>
+      </p:sp>
+      <p:sp>
+        <p:nvSpPr>
+          <p:cNvPr id="53" name="Rectángulo 52"/>
+          <p:cNvSpPr/>
+          <p:nvPr/>
+        </p:nvSpPr>
+        <p:spPr>
+          <a:xfrm>
+            <a:off x="8198718" y="5735303"/>
+            <a:ext cx="1413346" cy="639780"/>
+          </a:xfrm>
+          <a:prstGeom prst="rect">
+            <a:avLst/>
+          </a:prstGeom>
+        </p:spPr>
+        <p:style>
+          <a:lnRef idx="2">
+            <a:schemeClr val="dk1"/>
+          </a:lnRef>
+          <a:fillRef idx="1">
+            <a:schemeClr val="lt1"/>
+          </a:fillRef>
+          <a:effectRef idx="0">
+            <a:schemeClr val="dk1"/>
+          </a:effectRef>
+          <a:fontRef idx="minor">
+            <a:schemeClr val="dk1"/>
+          </a:fontRef>
+        </p:style>
+        <p:txBody>
+          <a:bodyPr rtlCol="0" anchor="ctr"/>
+          <a:lstStyle/>
+          <a:p>
+            <a:pPr algn="ctr"/>
+            <a:r>
+              <a:rPr lang="es-ES" sz="1400" dirty="0">
+                <a:solidFill>
+                  <a:schemeClr val="dk1"/>
+                </a:solidFill>
+              </a:rPr>
+              <a:t>Medios de pago, logos</a:t>
+            </a:r>
+          </a:p>
+        </p:txBody>
+      </p:sp>
+      <p:sp>
+        <p:nvSpPr>
+          <p:cNvPr id="54" name="Rectángulo 53"/>
+          <p:cNvSpPr/>
+          <p:nvPr/>
+        </p:nvSpPr>
+        <p:spPr>
+          <a:xfrm>
+            <a:off x="9791114" y="5732436"/>
+            <a:ext cx="1386149" cy="264627"/>
+          </a:xfrm>
+          <a:prstGeom prst="rect">
+            <a:avLst/>
+          </a:prstGeom>
+        </p:spPr>
+        <p:style>
+          <a:lnRef idx="2">
+            <a:schemeClr val="dk1"/>
+          </a:lnRef>
+          <a:fillRef idx="1">
+            <a:schemeClr val="lt1"/>
+          </a:fillRef>
+          <a:effectRef idx="0">
+            <a:schemeClr val="dk1"/>
+          </a:effectRef>
+          <a:fontRef idx="minor">
+            <a:schemeClr val="dk1"/>
+          </a:fontRef>
+        </p:style>
+        <p:txBody>
+          <a:bodyPr rtlCol="0" anchor="ctr"/>
+          <a:lstStyle/>
+          <a:p>
+            <a:pPr algn="ctr"/>
+            <a:r>
+              <a:rPr lang="es-ES" sz="1400" dirty="0">
+                <a:solidFill>
+                  <a:schemeClr val="dk1"/>
+                </a:solidFill>
+              </a:rPr>
+              <a:t>Logos Redes</a:t>
+            </a:r>
+          </a:p>
+        </p:txBody>
+      </p:sp>
+      <p:sp>
+        <p:nvSpPr>
+          <p:cNvPr id="55" name="Rectángulo 54"/>
+          <p:cNvSpPr/>
+          <p:nvPr/>
+        </p:nvSpPr>
+        <p:spPr>
+          <a:xfrm>
+            <a:off x="9791113" y="6094180"/>
+            <a:ext cx="1386149" cy="280904"/>
+          </a:xfrm>
+          <a:prstGeom prst="rect">
+            <a:avLst/>
+          </a:prstGeom>
+        </p:spPr>
+        <p:style>
+          <a:lnRef idx="2">
+            <a:schemeClr val="dk1"/>
+          </a:lnRef>
+          <a:fillRef idx="1">
+            <a:schemeClr val="lt1"/>
+          </a:fillRef>
+          <a:effectRef idx="0">
+            <a:schemeClr val="dk1"/>
+          </a:effectRef>
+          <a:fontRef idx="minor">
+            <a:schemeClr val="dk1"/>
+          </a:fontRef>
+        </p:style>
+        <p:txBody>
+          <a:bodyPr rtlCol="0" anchor="ctr"/>
+          <a:lstStyle/>
+          <a:p>
+            <a:pPr algn="ctr"/>
+            <a:r>
+              <a:rPr lang="es-ES" sz="1200" dirty="0" err="1">
+                <a:solidFill>
+                  <a:schemeClr val="dk1"/>
+                </a:solidFill>
+              </a:rPr>
+              <a:t>Boton</a:t>
+            </a:r>
+            <a:r>
+              <a:rPr lang="es-ES" sz="1200" dirty="0">
+                <a:solidFill>
+                  <a:schemeClr val="dk1"/>
+                </a:solidFill>
+              </a:rPr>
+              <a:t> </a:t>
+            </a:r>
+            <a:r>
+              <a:rPr lang="es-ES" sz="1200" dirty="0" err="1">
+                <a:solidFill>
+                  <a:schemeClr val="dk1"/>
+                </a:solidFill>
+              </a:rPr>
+              <a:t>Contato</a:t>
+            </a:r>
+            <a:endParaRPr lang="es-ES" sz="1200" dirty="0">
+              <a:solidFill>
+                <a:schemeClr val="dk1"/>
+              </a:solidFill>
+            </a:endParaRPr>
+          </a:p>
+        </p:txBody>
+      </p:sp>
+      <p:sp>
+        <p:nvSpPr>
+          <p:cNvPr id="56" name="CuadroTexto 55"/>
+          <p:cNvSpPr txBox="1"/>
+          <p:nvPr/>
+        </p:nvSpPr>
+        <p:spPr>
+          <a:xfrm>
+            <a:off x="7772963" y="212557"/>
+            <a:ext cx="3655424" cy="923330"/>
+          </a:xfrm>
+          <a:prstGeom prst="rect">
+            <a:avLst/>
+          </a:prstGeom>
+          <a:noFill/>
+        </p:spPr>
+        <p:txBody>
+          <a:bodyPr wrap="none" rtlCol="0">
+            <a:spAutoFit/>
+          </a:bodyPr>
+          <a:lstStyle/>
+          <a:p>
+            <a:r>
+              <a:rPr lang="es-ES" dirty="0" smtClean="0"/>
+              <a:t>C =&gt; Categorías. Menú Hamburguesa</a:t>
+            </a:r>
+          </a:p>
+          <a:p>
+            <a:r>
+              <a:rPr lang="es-ES" dirty="0" smtClean="0"/>
+              <a:t>P =&gt; Mi perfil. Logo Personita</a:t>
+            </a:r>
+          </a:p>
+          <a:p>
+            <a:r>
+              <a:rPr lang="es-ES" dirty="0" smtClean="0"/>
+              <a:t>T =&gt; Carrito. Logo Carrito</a:t>
+            </a:r>
+            <a:endParaRPr lang="es-ES" dirty="0"/>
+          </a:p>
+        </p:txBody>
+      </p:sp>
+      <p:sp>
+        <p:nvSpPr>
+          <p:cNvPr id="68" name="CuadroTexto 67"/>
+          <p:cNvSpPr txBox="1"/>
+          <p:nvPr/>
+        </p:nvSpPr>
+        <p:spPr>
+          <a:xfrm>
+            <a:off x="4949877" y="0"/>
+            <a:ext cx="2108141" cy="369332"/>
+          </a:xfrm>
+          <a:prstGeom prst="rect">
+            <a:avLst/>
+          </a:prstGeom>
+          <a:noFill/>
+        </p:spPr>
+        <p:txBody>
+          <a:bodyPr wrap="none" rtlCol="0">
+            <a:spAutoFit/>
+          </a:bodyPr>
+          <a:lstStyle/>
+          <a:p>
+            <a:r>
+              <a:rPr lang="es-ES" dirty="0" smtClean="0"/>
+              <a:t>Escala 1px = 0,03 cm</a:t>
+            </a:r>
+            <a:endParaRPr lang="es-ES" dirty="0"/>
+          </a:p>
+        </p:txBody>
+      </p:sp>
+      <p:sp>
+        <p:nvSpPr>
+          <p:cNvPr id="34" name="Rectángulo 33"/>
+          <p:cNvSpPr/>
+          <p:nvPr/>
+        </p:nvSpPr>
+        <p:spPr>
+          <a:xfrm>
+            <a:off x="2408349" y="4648530"/>
+            <a:ext cx="1540800" cy="1520259"/>
           </a:xfrm>
           <a:prstGeom prst="rect">
             <a:avLst/>
@@ -3611,44 +4089,14 @@
       </p:sp>
       <p:sp>
         <p:nvSpPr>
-          <p:cNvPr id="24" name="CuadroTexto 23"/>
+          <p:cNvPr id="35" name="CuadroTexto 34"/>
           <p:cNvSpPr txBox="1"/>
           <p:nvPr/>
         </p:nvSpPr>
         <p:spPr>
           <a:xfrm>
-            <a:off x="1379077" y="4274179"/>
-            <a:ext cx="2092496" cy="369332"/>
-          </a:xfrm>
-          <a:prstGeom prst="rect">
-            <a:avLst/>
-          </a:prstGeom>
-          <a:noFill/>
-        </p:spPr>
-        <p:txBody>
-          <a:bodyPr wrap="none" rtlCol="0">
-            <a:spAutoFit/>
-          </a:bodyPr>
-          <a:lstStyle/>
-          <a:p>
-            <a:r>
-              <a:rPr lang="es-ES" dirty="0" smtClean="0"/>
-              <a:t>Destacados para vos</a:t>
-            </a:r>
-            <a:endParaRPr lang="es-ES" dirty="0"/>
-          </a:p>
-        </p:txBody>
-      </p:sp>
-      <p:sp>
-        <p:nvSpPr>
-          <p:cNvPr id="25" name="CuadroTexto 24"/>
-          <p:cNvSpPr txBox="1"/>
-          <p:nvPr/>
-        </p:nvSpPr>
-        <p:spPr>
-          <a:xfrm>
-            <a:off x="883685" y="6168886"/>
-            <a:ext cx="3096137" cy="307777"/>
+            <a:off x="2270716" y="6168790"/>
+            <a:ext cx="1696250" cy="312892"/>
           </a:xfrm>
           <a:prstGeom prst="rect">
             <a:avLst/>
@@ -3672,14 +4120,74 @@
       </p:sp>
       <p:sp>
         <p:nvSpPr>
-          <p:cNvPr id="33" name="Rectángulo 32"/>
-          <p:cNvSpPr/>
-          <p:nvPr/>
-        </p:nvSpPr>
-        <p:spPr>
-          <a:xfrm>
-            <a:off x="4555621" y="1586921"/>
-            <a:ext cx="3000659" cy="1752962"/>
+          <p:cNvPr id="37" name="Rectángulo 36"/>
+          <p:cNvSpPr/>
+          <p:nvPr/>
+        </p:nvSpPr>
+        <p:spPr>
+          <a:xfrm>
+            <a:off x="4555618" y="1594183"/>
+            <a:ext cx="1515600" cy="1520259"/>
+          </a:xfrm>
+          <a:prstGeom prst="rect">
+            <a:avLst/>
+          </a:prstGeom>
+        </p:spPr>
+        <p:style>
+          <a:lnRef idx="2">
+            <a:schemeClr val="dk1"/>
+          </a:lnRef>
+          <a:fillRef idx="1">
+            <a:schemeClr val="lt1"/>
+          </a:fillRef>
+          <a:effectRef idx="0">
+            <a:schemeClr val="dk1"/>
+          </a:effectRef>
+          <a:fontRef idx="minor">
+            <a:schemeClr val="dk1"/>
+          </a:fontRef>
+        </p:style>
+        <p:txBody>
+          <a:bodyPr rtlCol="0" anchor="ctr"/>
+          <a:lstStyle/>
+          <a:p>
+            <a:pPr algn="ctr"/>
+            <a:r>
+              <a:rPr lang="es-ES" dirty="0">
+                <a:solidFill>
+                  <a:schemeClr val="dk1"/>
+                </a:solidFill>
+              </a:rPr>
+              <a:t>Imagen </a:t>
+            </a:r>
+            <a:r>
+              <a:rPr lang="es-ES" dirty="0" smtClean="0">
+                <a:solidFill>
+                  <a:schemeClr val="dk1"/>
+                </a:solidFill>
+              </a:rPr>
+              <a:t>articulo</a:t>
+            </a:r>
+          </a:p>
+          <a:p>
+            <a:pPr algn="ctr"/>
+            <a:r>
+              <a:rPr lang="es-ES" sz="1200" dirty="0" smtClean="0"/>
+              <a:t>40% ancho total</a:t>
+            </a:r>
+          </a:p>
+        </p:txBody>
+      </p:sp>
+      <p:sp>
+        <p:nvSpPr>
+          <p:cNvPr id="38" name="Rectángulo 37"/>
+          <p:cNvSpPr/>
+          <p:nvPr/>
+        </p:nvSpPr>
+        <p:spPr>
+          <a:xfrm>
+            <a:off x="6067685" y="1594183"/>
+            <a:ext cx="1515600" cy="1520259"/>
           </a:xfrm>
           <a:prstGeom prst="rect">
             <a:avLst/>
@@ -3713,499 +4221,18 @@
               <a:t>Imagen articulo</a:t>
             </a:r>
           </a:p>
-          <a:p>
-            <a:pPr algn="ctr"/>
-            <a:r>
-              <a:rPr lang="es-ES" dirty="0">
-                <a:solidFill>
-                  <a:schemeClr val="dk1"/>
-                </a:solidFill>
-              </a:rPr>
-              <a:t>80% del ancho total</a:t>
-            </a:r>
-          </a:p>
-          <a:p>
-            <a:pPr algn="ctr"/>
-            <a:r>
-              <a:rPr lang="es-ES" dirty="0">
-                <a:solidFill>
-                  <a:schemeClr val="dk1"/>
-                </a:solidFill>
-              </a:rPr>
-              <a:t>34% del alto total</a:t>
-            </a:r>
-          </a:p>
-        </p:txBody>
-      </p:sp>
-      <p:sp>
-        <p:nvSpPr>
-          <p:cNvPr id="36" name="Rectángulo 35"/>
-          <p:cNvSpPr/>
-          <p:nvPr/>
-        </p:nvSpPr>
-        <p:spPr>
-          <a:xfrm>
-            <a:off x="4555621" y="3937232"/>
-            <a:ext cx="3000659" cy="1752962"/>
-          </a:xfrm>
-          <a:prstGeom prst="rect">
-            <a:avLst/>
-          </a:prstGeom>
-        </p:spPr>
-        <p:style>
-          <a:lnRef idx="2">
-            <a:schemeClr val="dk1"/>
-          </a:lnRef>
-          <a:fillRef idx="1">
-            <a:schemeClr val="lt1"/>
-          </a:fillRef>
-          <a:effectRef idx="0">
-            <a:schemeClr val="dk1"/>
-          </a:effectRef>
-          <a:fontRef idx="minor">
-            <a:schemeClr val="dk1"/>
-          </a:fontRef>
-        </p:style>
-        <p:txBody>
-          <a:bodyPr rtlCol="0" anchor="ctr"/>
-          <a:lstStyle/>
-          <a:p>
-            <a:pPr algn="ctr"/>
-            <a:r>
-              <a:rPr lang="es-ES">
-                <a:solidFill>
-                  <a:schemeClr val="dk1"/>
-                </a:solidFill>
-              </a:rPr>
-              <a:t>Imagen articulo</a:t>
-            </a:r>
-            <a:endParaRPr lang="es-ES" dirty="0">
-              <a:solidFill>
-                <a:schemeClr val="dk1"/>
-              </a:solidFill>
-            </a:endParaRPr>
-          </a:p>
-        </p:txBody>
-      </p:sp>
-      <p:sp>
-        <p:nvSpPr>
-          <p:cNvPr id="40" name="Rectángulo 39"/>
-          <p:cNvSpPr/>
-          <p:nvPr/>
-        </p:nvSpPr>
-        <p:spPr>
-          <a:xfrm>
-            <a:off x="8176604" y="1354217"/>
-            <a:ext cx="3000659" cy="485158"/>
-          </a:xfrm>
-          <a:prstGeom prst="rect">
-            <a:avLst/>
-          </a:prstGeom>
-        </p:spPr>
-        <p:style>
-          <a:lnRef idx="2">
-            <a:schemeClr val="dk1"/>
-          </a:lnRef>
-          <a:fillRef idx="1">
-            <a:schemeClr val="lt1"/>
-          </a:fillRef>
-          <a:effectRef idx="0">
-            <a:schemeClr val="dk1"/>
-          </a:effectRef>
-          <a:fontRef idx="minor">
-            <a:schemeClr val="dk1"/>
-          </a:fontRef>
-        </p:style>
-        <p:txBody>
-          <a:bodyPr rtlCol="0" anchor="ctr"/>
-          <a:lstStyle/>
-          <a:p>
-            <a:pPr algn="ctr"/>
-            <a:r>
-              <a:rPr lang="es-ES" dirty="0">
-                <a:solidFill>
-                  <a:schemeClr val="dk1"/>
-                </a:solidFill>
-              </a:rPr>
-              <a:t>Imagen Articulo</a:t>
-            </a:r>
-          </a:p>
-        </p:txBody>
-      </p:sp>
-      <p:sp>
-        <p:nvSpPr>
-          <p:cNvPr id="43" name="Rectángulo 42"/>
-          <p:cNvSpPr/>
-          <p:nvPr/>
-        </p:nvSpPr>
-        <p:spPr>
-          <a:xfrm>
-            <a:off x="8176604" y="2436725"/>
-            <a:ext cx="3000659" cy="1752962"/>
-          </a:xfrm>
-          <a:prstGeom prst="rect">
-            <a:avLst/>
-          </a:prstGeom>
-        </p:spPr>
-        <p:style>
-          <a:lnRef idx="2">
-            <a:schemeClr val="dk1"/>
-          </a:lnRef>
-          <a:fillRef idx="1">
-            <a:schemeClr val="lt1"/>
-          </a:fillRef>
-          <a:effectRef idx="0">
-            <a:schemeClr val="dk1"/>
-          </a:effectRef>
-          <a:fontRef idx="minor">
-            <a:schemeClr val="dk1"/>
-          </a:fontRef>
-        </p:style>
-        <p:txBody>
-          <a:bodyPr rtlCol="0" anchor="ctr"/>
-          <a:lstStyle/>
-          <a:p>
-            <a:pPr algn="ctr"/>
-            <a:r>
-              <a:rPr lang="es-ES" dirty="0">
-                <a:solidFill>
-                  <a:schemeClr val="dk1"/>
-                </a:solidFill>
-              </a:rPr>
-              <a:t>Imagen Articulo</a:t>
-            </a:r>
-          </a:p>
-        </p:txBody>
-      </p:sp>
-      <p:sp>
-        <p:nvSpPr>
-          <p:cNvPr id="46" name="Rectángulo 45"/>
-          <p:cNvSpPr/>
-          <p:nvPr/>
-        </p:nvSpPr>
-        <p:spPr>
-          <a:xfrm>
-            <a:off x="8198718" y="5160591"/>
-            <a:ext cx="2460913" cy="340160"/>
-          </a:xfrm>
-          <a:prstGeom prst="rect">
-            <a:avLst/>
-          </a:prstGeom>
-        </p:spPr>
-        <p:style>
-          <a:lnRef idx="2">
-            <a:schemeClr val="dk1"/>
-          </a:lnRef>
-          <a:fillRef idx="1">
-            <a:schemeClr val="lt1"/>
-          </a:fillRef>
-          <a:effectRef idx="0">
-            <a:schemeClr val="dk1"/>
-          </a:effectRef>
-          <a:fontRef idx="minor">
-            <a:schemeClr val="dk1"/>
-          </a:fontRef>
-        </p:style>
-        <p:txBody>
-          <a:bodyPr rtlCol="0" anchor="ctr"/>
-          <a:lstStyle/>
-          <a:p>
-            <a:pPr algn="ctr"/>
-            <a:r>
-              <a:rPr lang="es-ES" dirty="0">
-                <a:solidFill>
-                  <a:schemeClr val="dk1"/>
-                </a:solidFill>
-              </a:rPr>
-              <a:t>Ingresa tu email</a:t>
-            </a:r>
-          </a:p>
-        </p:txBody>
-      </p:sp>
-      <p:sp>
-        <p:nvSpPr>
-          <p:cNvPr id="48" name="Rectángulo 47"/>
-          <p:cNvSpPr/>
-          <p:nvPr/>
-        </p:nvSpPr>
-        <p:spPr>
-          <a:xfrm>
-            <a:off x="10758099" y="5160591"/>
-            <a:ext cx="419164" cy="339203"/>
-          </a:xfrm>
-          <a:prstGeom prst="rect">
-            <a:avLst/>
-          </a:prstGeom>
-        </p:spPr>
-        <p:style>
-          <a:lnRef idx="2">
-            <a:schemeClr val="dk1"/>
-          </a:lnRef>
-          <a:fillRef idx="1">
-            <a:schemeClr val="lt1"/>
-          </a:fillRef>
-          <a:effectRef idx="0">
-            <a:schemeClr val="dk1"/>
-          </a:effectRef>
-          <a:fontRef idx="minor">
-            <a:schemeClr val="dk1"/>
-          </a:fontRef>
-        </p:style>
-        <p:txBody>
-          <a:bodyPr rtlCol="0" anchor="ctr"/>
-          <a:lstStyle/>
-          <a:p>
-            <a:pPr algn="ctr"/>
-            <a:r>
-              <a:rPr lang="es-ES" dirty="0">
-                <a:solidFill>
-                  <a:schemeClr val="dk1"/>
-                </a:solidFill>
-              </a:rPr>
-              <a:t>&gt;</a:t>
-            </a:r>
-          </a:p>
-        </p:txBody>
-      </p:sp>
-      <p:sp>
-        <p:nvSpPr>
-          <p:cNvPr id="49" name="CuadroTexto 48"/>
-          <p:cNvSpPr txBox="1"/>
-          <p:nvPr/>
-        </p:nvSpPr>
-        <p:spPr>
-          <a:xfrm>
-            <a:off x="8176603" y="4824677"/>
-            <a:ext cx="3000660" cy="338554"/>
-          </a:xfrm>
-          <a:prstGeom prst="rect">
-            <a:avLst/>
-          </a:prstGeom>
-          <a:noFill/>
-        </p:spPr>
-        <p:txBody>
-          <a:bodyPr wrap="square" rtlCol="0">
-            <a:spAutoFit/>
-          </a:bodyPr>
-          <a:lstStyle/>
-          <a:p>
-            <a:pPr algn="ctr"/>
-            <a:r>
-              <a:rPr lang="es-ES" sz="1600" dirty="0" err="1" smtClean="0"/>
-              <a:t>Newsletter</a:t>
-            </a:r>
-            <a:endParaRPr lang="es-ES" sz="1600" dirty="0"/>
-          </a:p>
-        </p:txBody>
-      </p:sp>
-      <p:sp>
-        <p:nvSpPr>
-          <p:cNvPr id="53" name="Rectángulo 52"/>
-          <p:cNvSpPr/>
-          <p:nvPr/>
-        </p:nvSpPr>
-        <p:spPr>
-          <a:xfrm>
-            <a:off x="8198718" y="5735303"/>
-            <a:ext cx="1413346" cy="639780"/>
-          </a:xfrm>
-          <a:prstGeom prst="rect">
-            <a:avLst/>
-          </a:prstGeom>
-        </p:spPr>
-        <p:style>
-          <a:lnRef idx="2">
-            <a:schemeClr val="dk1"/>
-          </a:lnRef>
-          <a:fillRef idx="1">
-            <a:schemeClr val="lt1"/>
-          </a:fillRef>
-          <a:effectRef idx="0">
-            <a:schemeClr val="dk1"/>
-          </a:effectRef>
-          <a:fontRef idx="minor">
-            <a:schemeClr val="dk1"/>
-          </a:fontRef>
-        </p:style>
-        <p:txBody>
-          <a:bodyPr rtlCol="0" anchor="ctr"/>
-          <a:lstStyle/>
-          <a:p>
-            <a:pPr algn="ctr"/>
-            <a:r>
-              <a:rPr lang="es-ES" sz="1400" dirty="0">
-                <a:solidFill>
-                  <a:schemeClr val="dk1"/>
-                </a:solidFill>
-              </a:rPr>
-              <a:t>Medios de pago, logos</a:t>
-            </a:r>
-          </a:p>
-        </p:txBody>
-      </p:sp>
-      <p:sp>
-        <p:nvSpPr>
-          <p:cNvPr id="54" name="Rectángulo 53"/>
-          <p:cNvSpPr/>
-          <p:nvPr/>
-        </p:nvSpPr>
-        <p:spPr>
-          <a:xfrm>
-            <a:off x="9791114" y="5732436"/>
-            <a:ext cx="1386149" cy="264627"/>
-          </a:xfrm>
-          <a:prstGeom prst="rect">
-            <a:avLst/>
-          </a:prstGeom>
-        </p:spPr>
-        <p:style>
-          <a:lnRef idx="2">
-            <a:schemeClr val="dk1"/>
-          </a:lnRef>
-          <a:fillRef idx="1">
-            <a:schemeClr val="lt1"/>
-          </a:fillRef>
-          <a:effectRef idx="0">
-            <a:schemeClr val="dk1"/>
-          </a:effectRef>
-          <a:fontRef idx="minor">
-            <a:schemeClr val="dk1"/>
-          </a:fontRef>
-        </p:style>
-        <p:txBody>
-          <a:bodyPr rtlCol="0" anchor="ctr"/>
-          <a:lstStyle/>
-          <a:p>
-            <a:pPr algn="ctr"/>
-            <a:r>
-              <a:rPr lang="es-ES" sz="1400" dirty="0">
-                <a:solidFill>
-                  <a:schemeClr val="dk1"/>
-                </a:solidFill>
-              </a:rPr>
-              <a:t>Logos Redes</a:t>
-            </a:r>
-          </a:p>
-        </p:txBody>
-      </p:sp>
-      <p:sp>
-        <p:nvSpPr>
-          <p:cNvPr id="55" name="Rectángulo 54"/>
-          <p:cNvSpPr/>
-          <p:nvPr/>
-        </p:nvSpPr>
-        <p:spPr>
-          <a:xfrm>
-            <a:off x="9791113" y="6094180"/>
-            <a:ext cx="1386149" cy="280904"/>
-          </a:xfrm>
-          <a:prstGeom prst="rect">
-            <a:avLst/>
-          </a:prstGeom>
-        </p:spPr>
-        <p:style>
-          <a:lnRef idx="2">
-            <a:schemeClr val="dk1"/>
-          </a:lnRef>
-          <a:fillRef idx="1">
-            <a:schemeClr val="lt1"/>
-          </a:fillRef>
-          <a:effectRef idx="0">
-            <a:schemeClr val="dk1"/>
-          </a:effectRef>
-          <a:fontRef idx="minor">
-            <a:schemeClr val="dk1"/>
-          </a:fontRef>
-        </p:style>
-        <p:txBody>
-          <a:bodyPr rtlCol="0" anchor="ctr"/>
-          <a:lstStyle/>
-          <a:p>
-            <a:pPr algn="ctr"/>
-            <a:r>
-              <a:rPr lang="es-ES" sz="1200" dirty="0" err="1">
-                <a:solidFill>
-                  <a:schemeClr val="dk1"/>
-                </a:solidFill>
-              </a:rPr>
-              <a:t>Boton</a:t>
-            </a:r>
-            <a:r>
-              <a:rPr lang="es-ES" sz="1200" dirty="0">
-                <a:solidFill>
-                  <a:schemeClr val="dk1"/>
-                </a:solidFill>
-              </a:rPr>
-              <a:t> </a:t>
-            </a:r>
-            <a:r>
-              <a:rPr lang="es-ES" sz="1200" dirty="0" err="1">
-                <a:solidFill>
-                  <a:schemeClr val="dk1"/>
-                </a:solidFill>
-              </a:rPr>
-              <a:t>Contato</a:t>
-            </a:r>
-            <a:endParaRPr lang="es-ES" sz="1200" dirty="0">
-              <a:solidFill>
-                <a:schemeClr val="dk1"/>
-              </a:solidFill>
-            </a:endParaRPr>
-          </a:p>
-        </p:txBody>
-      </p:sp>
-      <p:sp>
-        <p:nvSpPr>
-          <p:cNvPr id="56" name="CuadroTexto 55"/>
-          <p:cNvSpPr txBox="1"/>
-          <p:nvPr/>
-        </p:nvSpPr>
-        <p:spPr>
-          <a:xfrm>
-            <a:off x="7772963" y="212557"/>
-            <a:ext cx="3655424" cy="923330"/>
-          </a:xfrm>
-          <a:prstGeom prst="rect">
-            <a:avLst/>
-          </a:prstGeom>
-          <a:noFill/>
-        </p:spPr>
-        <p:txBody>
-          <a:bodyPr wrap="none" rtlCol="0">
-            <a:spAutoFit/>
-          </a:bodyPr>
-          <a:lstStyle/>
-          <a:p>
-            <a:r>
-              <a:rPr lang="es-ES" dirty="0" smtClean="0"/>
-              <a:t>C =&gt; Categorías. Menú Hamburguesa</a:t>
-            </a:r>
-          </a:p>
-          <a:p>
-            <a:r>
-              <a:rPr lang="es-ES" dirty="0" smtClean="0"/>
-              <a:t>P =&gt; Mi perfil. Logo Personita</a:t>
-            </a:r>
-          </a:p>
-          <a:p>
-            <a:r>
-              <a:rPr lang="es-ES" dirty="0" smtClean="0"/>
-              <a:t>T =&gt; Carrito. Logo Carrito</a:t>
-            </a:r>
-            <a:endParaRPr lang="es-ES" dirty="0"/>
-          </a:p>
-        </p:txBody>
-      </p:sp>
-      <p:sp>
-        <p:nvSpPr>
-          <p:cNvPr id="62" name="Rectángulo 61"/>
-          <p:cNvSpPr/>
-          <p:nvPr/>
-        </p:nvSpPr>
-        <p:spPr>
-          <a:xfrm>
-            <a:off x="4555620" y="5688735"/>
-            <a:ext cx="3000659" cy="597349"/>
+        </p:txBody>
+      </p:sp>
+      <p:sp>
+        <p:nvSpPr>
+          <p:cNvPr id="42" name="Rectángulo 41"/>
+          <p:cNvSpPr/>
+          <p:nvPr/>
+        </p:nvSpPr>
+        <p:spPr>
+          <a:xfrm>
+            <a:off x="6069453" y="3113713"/>
+            <a:ext cx="1512063" cy="597349"/>
           </a:xfrm>
           <a:prstGeom prst="rect">
             <a:avLst/>
@@ -4253,14 +4280,14 @@
       </p:sp>
       <p:sp>
         <p:nvSpPr>
-          <p:cNvPr id="63" name="Rectángulo 62"/>
-          <p:cNvSpPr/>
-          <p:nvPr/>
-        </p:nvSpPr>
-        <p:spPr>
-          <a:xfrm>
-            <a:off x="8176603" y="1859713"/>
-            <a:ext cx="3000659" cy="597349"/>
+          <p:cNvPr id="44" name="Rectángulo 43"/>
+          <p:cNvSpPr/>
+          <p:nvPr/>
+        </p:nvSpPr>
+        <p:spPr>
+          <a:xfrm>
+            <a:off x="4557386" y="5311834"/>
+            <a:ext cx="1512063" cy="597349"/>
           </a:xfrm>
           <a:prstGeom prst="rect">
             <a:avLst/>
@@ -4292,9 +4319,21 @@
           <a:p>
             <a:pPr algn="ctr"/>
             <a:r>
-              <a:rPr lang="es-ES" sz="1400" dirty="0" smtClean="0"/>
-              <a:t>Nombre del Articulo</a:t>
-            </a:r>
+              <a:rPr lang="es-ES" sz="1200" dirty="0" smtClean="0"/>
+              <a:t>Nombre del </a:t>
+            </a:r>
+            <a:r>
+              <a:rPr lang="es-ES" sz="1200" dirty="0" smtClean="0"/>
+              <a:t>Articulo</a:t>
+            </a:r>
+            <a:br>
+              <a:rPr lang="es-ES" sz="1200" dirty="0" smtClean="0"/>
+            </a:br>
+            <a:r>
+              <a:rPr lang="es-ES" sz="1200" dirty="0" smtClean="0"/>
+              <a:t>Categoría</a:t>
+            </a:r>
+            <a:endParaRPr lang="es-ES" sz="1200" dirty="0" smtClean="0"/>
           </a:p>
           <a:p>
             <a:pPr algn="ctr"/>
@@ -4308,14 +4347,135 @@
       </p:sp>
       <p:sp>
         <p:nvSpPr>
-          <p:cNvPr id="64" name="Rectángulo 63"/>
-          <p:cNvSpPr/>
-          <p:nvPr/>
-        </p:nvSpPr>
-        <p:spPr>
-          <a:xfrm>
-            <a:off x="8174255" y="4192370"/>
-            <a:ext cx="3000659" cy="597349"/>
+          <p:cNvPr id="45" name="Rectángulo 44"/>
+          <p:cNvSpPr/>
+          <p:nvPr/>
+        </p:nvSpPr>
+        <p:spPr>
+          <a:xfrm>
+            <a:off x="4555618" y="3792304"/>
+            <a:ext cx="1515600" cy="1520259"/>
+          </a:xfrm>
+          <a:prstGeom prst="rect">
+            <a:avLst/>
+          </a:prstGeom>
+        </p:spPr>
+        <p:style>
+          <a:lnRef idx="2">
+            <a:schemeClr val="dk1"/>
+          </a:lnRef>
+          <a:fillRef idx="1">
+            <a:schemeClr val="lt1"/>
+          </a:fillRef>
+          <a:effectRef idx="0">
+            <a:schemeClr val="dk1"/>
+          </a:effectRef>
+          <a:fontRef idx="minor">
+            <a:schemeClr val="dk1"/>
+          </a:fontRef>
+        </p:style>
+        <p:txBody>
+          <a:bodyPr rtlCol="0" anchor="ctr"/>
+          <a:lstStyle/>
+          <a:p>
+            <a:pPr algn="ctr"/>
+            <a:r>
+              <a:rPr lang="es-ES" dirty="0">
+                <a:solidFill>
+                  <a:schemeClr val="dk1"/>
+                </a:solidFill>
+              </a:rPr>
+              <a:t>Imagen </a:t>
+            </a:r>
+            <a:r>
+              <a:rPr lang="es-ES" dirty="0" smtClean="0">
+                <a:solidFill>
+                  <a:schemeClr val="dk1"/>
+                </a:solidFill>
+              </a:rPr>
+              <a:t>articulo</a:t>
+            </a:r>
+          </a:p>
+          <a:p>
+            <a:pPr algn="ctr"/>
+            <a:r>
+              <a:rPr lang="es-ES" sz="1200" dirty="0" smtClean="0"/>
+              <a:t>40% ancho total</a:t>
+            </a:r>
+          </a:p>
+          <a:p>
+            <a:pPr algn="ctr"/>
+            <a:r>
+              <a:rPr lang="es-ES" sz="1200" dirty="0" smtClean="0">
+                <a:solidFill>
+                  <a:schemeClr val="dk1"/>
+                </a:solidFill>
+              </a:rPr>
+              <a:t>34% alto total</a:t>
+            </a:r>
+            <a:endParaRPr lang="es-ES" sz="1200" dirty="0">
+              <a:solidFill>
+                <a:schemeClr val="dk1"/>
+              </a:solidFill>
+            </a:endParaRPr>
+          </a:p>
+        </p:txBody>
+      </p:sp>
+      <p:sp>
+        <p:nvSpPr>
+          <p:cNvPr id="47" name="Rectángulo 46"/>
+          <p:cNvSpPr/>
+          <p:nvPr/>
+        </p:nvSpPr>
+        <p:spPr>
+          <a:xfrm>
+            <a:off x="6067685" y="3792304"/>
+            <a:ext cx="1515600" cy="1520259"/>
+          </a:xfrm>
+          <a:prstGeom prst="rect">
+            <a:avLst/>
+          </a:prstGeom>
+        </p:spPr>
+        <p:style>
+          <a:lnRef idx="2">
+            <a:schemeClr val="dk1"/>
+          </a:lnRef>
+          <a:fillRef idx="1">
+            <a:schemeClr val="lt1"/>
+          </a:fillRef>
+          <a:effectRef idx="0">
+            <a:schemeClr val="dk1"/>
+          </a:effectRef>
+          <a:fontRef idx="minor">
+            <a:schemeClr val="dk1"/>
+          </a:fontRef>
+        </p:style>
+        <p:txBody>
+          <a:bodyPr rtlCol="0" anchor="ctr"/>
+          <a:lstStyle/>
+          <a:p>
+            <a:pPr algn="ctr"/>
+            <a:r>
+              <a:rPr lang="es-ES" dirty="0">
+                <a:solidFill>
+                  <a:schemeClr val="dk1"/>
+                </a:solidFill>
+              </a:rPr>
+              <a:t>Imagen articulo</a:t>
+            </a:r>
+          </a:p>
+        </p:txBody>
+      </p:sp>
+      <p:sp>
+        <p:nvSpPr>
+          <p:cNvPr id="50" name="Rectángulo 49"/>
+          <p:cNvSpPr/>
+          <p:nvPr/>
+        </p:nvSpPr>
+        <p:spPr>
+          <a:xfrm>
+            <a:off x="6069453" y="5311834"/>
+            <a:ext cx="1512063" cy="597349"/>
           </a:xfrm>
           <a:prstGeom prst="rect">
             <a:avLst/>
@@ -4363,31 +4523,450 @@
       </p:sp>
       <p:sp>
         <p:nvSpPr>
-          <p:cNvPr id="68" name="CuadroTexto 67"/>
-          <p:cNvSpPr txBox="1"/>
-          <p:nvPr/>
-        </p:nvSpPr>
-        <p:spPr>
-          <a:xfrm>
-            <a:off x="4949877" y="0"/>
-            <a:ext cx="2108141" cy="369332"/>
-          </a:xfrm>
-          <a:prstGeom prst="rect">
-            <a:avLst/>
-          </a:prstGeom>
-          <a:noFill/>
-        </p:spPr>
-        <p:txBody>
-          <a:bodyPr wrap="none" rtlCol="0">
-            <a:spAutoFit/>
-          </a:bodyPr>
-          <a:lstStyle/>
-          <a:p>
-            <a:r>
-              <a:rPr lang="es-ES" dirty="0" smtClean="0"/>
-              <a:t>Escala 1px = 0,03 cm</a:t>
-            </a:r>
-            <a:endParaRPr lang="es-ES" dirty="0"/>
+          <p:cNvPr id="51" name="Rectángulo 50"/>
+          <p:cNvSpPr/>
+          <p:nvPr/>
+        </p:nvSpPr>
+        <p:spPr>
+          <a:xfrm>
+            <a:off x="8178371" y="4036593"/>
+            <a:ext cx="1512063" cy="597349"/>
+          </a:xfrm>
+          <a:prstGeom prst="rect">
+            <a:avLst/>
+          </a:prstGeom>
+          <a:solidFill>
+            <a:schemeClr val="bg1">
+              <a:lumMod val="85000"/>
+              <a:alpha val="28000"/>
+            </a:schemeClr>
+          </a:solidFill>
+        </p:spPr>
+        <p:style>
+          <a:lnRef idx="1">
+            <a:schemeClr val="accent3"/>
+          </a:lnRef>
+          <a:fillRef idx="2">
+            <a:schemeClr val="accent3"/>
+          </a:fillRef>
+          <a:effectRef idx="1">
+            <a:schemeClr val="accent3"/>
+          </a:effectRef>
+          <a:fontRef idx="minor">
+            <a:schemeClr val="dk1"/>
+          </a:fontRef>
+        </p:style>
+        <p:txBody>
+          <a:bodyPr rtlCol="0" anchor="ctr"/>
+          <a:lstStyle/>
+          <a:p>
+            <a:pPr algn="ctr"/>
+            <a:r>
+              <a:rPr lang="es-ES" sz="1200" dirty="0" smtClean="0"/>
+              <a:t>Nombre del </a:t>
+            </a:r>
+            <a:r>
+              <a:rPr lang="es-ES" sz="1200" dirty="0" smtClean="0"/>
+              <a:t>Articulo</a:t>
+            </a:r>
+            <a:br>
+              <a:rPr lang="es-ES" sz="1200" dirty="0" smtClean="0"/>
+            </a:br>
+            <a:r>
+              <a:rPr lang="es-ES" sz="1200" dirty="0" smtClean="0"/>
+              <a:t>Categoría</a:t>
+            </a:r>
+            <a:endParaRPr lang="es-ES" sz="1200" dirty="0" smtClean="0"/>
+          </a:p>
+          <a:p>
+            <a:pPr algn="ctr"/>
+            <a:r>
+              <a:rPr lang="es-ES" sz="1100" dirty="0" smtClean="0"/>
+              <a:t>$ 0,00</a:t>
+            </a:r>
+            <a:endParaRPr lang="es-ES" sz="1100" dirty="0"/>
+          </a:p>
+        </p:txBody>
+      </p:sp>
+      <p:sp>
+        <p:nvSpPr>
+          <p:cNvPr id="52" name="Rectángulo 51"/>
+          <p:cNvSpPr/>
+          <p:nvPr/>
+        </p:nvSpPr>
+        <p:spPr>
+          <a:xfrm>
+            <a:off x="8176603" y="2517063"/>
+            <a:ext cx="1515600" cy="1520259"/>
+          </a:xfrm>
+          <a:prstGeom prst="rect">
+            <a:avLst/>
+          </a:prstGeom>
+        </p:spPr>
+        <p:style>
+          <a:lnRef idx="2">
+            <a:schemeClr val="dk1"/>
+          </a:lnRef>
+          <a:fillRef idx="1">
+            <a:schemeClr val="lt1"/>
+          </a:fillRef>
+          <a:effectRef idx="0">
+            <a:schemeClr val="dk1"/>
+          </a:effectRef>
+          <a:fontRef idx="minor">
+            <a:schemeClr val="dk1"/>
+          </a:fontRef>
+        </p:style>
+        <p:txBody>
+          <a:bodyPr rtlCol="0" anchor="ctr"/>
+          <a:lstStyle/>
+          <a:p>
+            <a:pPr algn="ctr"/>
+            <a:r>
+              <a:rPr lang="es-ES" dirty="0">
+                <a:solidFill>
+                  <a:schemeClr val="dk1"/>
+                </a:solidFill>
+              </a:rPr>
+              <a:t>Imagen </a:t>
+            </a:r>
+            <a:r>
+              <a:rPr lang="es-ES" dirty="0" smtClean="0">
+                <a:solidFill>
+                  <a:schemeClr val="dk1"/>
+                </a:solidFill>
+              </a:rPr>
+              <a:t>articulo</a:t>
+            </a:r>
+          </a:p>
+          <a:p>
+            <a:pPr algn="ctr"/>
+            <a:r>
+              <a:rPr lang="es-ES" sz="1200" dirty="0" smtClean="0"/>
+              <a:t>40% ancho total</a:t>
+            </a:r>
+          </a:p>
+        </p:txBody>
+      </p:sp>
+      <p:sp>
+        <p:nvSpPr>
+          <p:cNvPr id="57" name="Rectángulo 56"/>
+          <p:cNvSpPr/>
+          <p:nvPr/>
+        </p:nvSpPr>
+        <p:spPr>
+          <a:xfrm>
+            <a:off x="9688670" y="2517063"/>
+            <a:ext cx="1515600" cy="1520259"/>
+          </a:xfrm>
+          <a:prstGeom prst="rect">
+            <a:avLst/>
+          </a:prstGeom>
+        </p:spPr>
+        <p:style>
+          <a:lnRef idx="2">
+            <a:schemeClr val="dk1"/>
+          </a:lnRef>
+          <a:fillRef idx="1">
+            <a:schemeClr val="lt1"/>
+          </a:fillRef>
+          <a:effectRef idx="0">
+            <a:schemeClr val="dk1"/>
+          </a:effectRef>
+          <a:fontRef idx="minor">
+            <a:schemeClr val="dk1"/>
+          </a:fontRef>
+        </p:style>
+        <p:txBody>
+          <a:bodyPr rtlCol="0" anchor="ctr"/>
+          <a:lstStyle/>
+          <a:p>
+            <a:pPr algn="ctr"/>
+            <a:r>
+              <a:rPr lang="es-ES" dirty="0">
+                <a:solidFill>
+                  <a:schemeClr val="dk1"/>
+                </a:solidFill>
+              </a:rPr>
+              <a:t>Imagen articulo</a:t>
+            </a:r>
+          </a:p>
+        </p:txBody>
+      </p:sp>
+      <p:sp>
+        <p:nvSpPr>
+          <p:cNvPr id="58" name="Rectángulo 57"/>
+          <p:cNvSpPr/>
+          <p:nvPr/>
+        </p:nvSpPr>
+        <p:spPr>
+          <a:xfrm>
+            <a:off x="9690438" y="4036593"/>
+            <a:ext cx="1512063" cy="597349"/>
+          </a:xfrm>
+          <a:prstGeom prst="rect">
+            <a:avLst/>
+          </a:prstGeom>
+          <a:solidFill>
+            <a:schemeClr val="bg1">
+              <a:lumMod val="85000"/>
+              <a:alpha val="28000"/>
+            </a:schemeClr>
+          </a:solidFill>
+        </p:spPr>
+        <p:style>
+          <a:lnRef idx="1">
+            <a:schemeClr val="accent3"/>
+          </a:lnRef>
+          <a:fillRef idx="2">
+            <a:schemeClr val="accent3"/>
+          </a:fillRef>
+          <a:effectRef idx="1">
+            <a:schemeClr val="accent3"/>
+          </a:effectRef>
+          <a:fontRef idx="minor">
+            <a:schemeClr val="dk1"/>
+          </a:fontRef>
+        </p:style>
+        <p:txBody>
+          <a:bodyPr rtlCol="0" anchor="ctr"/>
+          <a:lstStyle/>
+          <a:p>
+            <a:pPr algn="ctr"/>
+            <a:r>
+              <a:rPr lang="es-ES" sz="1400" dirty="0" smtClean="0"/>
+              <a:t>Nombre del Articulo</a:t>
+            </a:r>
+          </a:p>
+          <a:p>
+            <a:pPr algn="ctr"/>
+            <a:r>
+              <a:rPr lang="es-ES" sz="1100" dirty="0" smtClean="0"/>
+              <a:t>$ 0,00</a:t>
+            </a:r>
+            <a:endParaRPr lang="es-ES" sz="1100" dirty="0"/>
+          </a:p>
+        </p:txBody>
+      </p:sp>
+      <p:sp>
+        <p:nvSpPr>
+          <p:cNvPr id="60" name="Rectángulo 59"/>
+          <p:cNvSpPr/>
+          <p:nvPr/>
+        </p:nvSpPr>
+        <p:spPr>
+          <a:xfrm>
+            <a:off x="8178371" y="1774481"/>
+            <a:ext cx="1512063" cy="597349"/>
+          </a:xfrm>
+          <a:prstGeom prst="rect">
+            <a:avLst/>
+          </a:prstGeom>
+          <a:solidFill>
+            <a:schemeClr val="bg1">
+              <a:lumMod val="85000"/>
+              <a:alpha val="28000"/>
+            </a:schemeClr>
+          </a:solidFill>
+        </p:spPr>
+        <p:style>
+          <a:lnRef idx="1">
+            <a:schemeClr val="accent3"/>
+          </a:lnRef>
+          <a:fillRef idx="2">
+            <a:schemeClr val="accent3"/>
+          </a:fillRef>
+          <a:effectRef idx="1">
+            <a:schemeClr val="accent3"/>
+          </a:effectRef>
+          <a:fontRef idx="minor">
+            <a:schemeClr val="dk1"/>
+          </a:fontRef>
+        </p:style>
+        <p:txBody>
+          <a:bodyPr rtlCol="0" anchor="ctr"/>
+          <a:lstStyle/>
+          <a:p>
+            <a:pPr algn="ctr"/>
+            <a:r>
+              <a:rPr lang="es-ES" sz="1200" dirty="0" smtClean="0"/>
+              <a:t>Nombre del </a:t>
+            </a:r>
+            <a:r>
+              <a:rPr lang="es-ES" sz="1200" dirty="0" smtClean="0"/>
+              <a:t>Articulo</a:t>
+            </a:r>
+            <a:br>
+              <a:rPr lang="es-ES" sz="1200" dirty="0" smtClean="0"/>
+            </a:br>
+            <a:r>
+              <a:rPr lang="es-ES" sz="1200" dirty="0" smtClean="0"/>
+              <a:t>Categoría</a:t>
+            </a:r>
+            <a:endParaRPr lang="es-ES" sz="1200" dirty="0" smtClean="0"/>
+          </a:p>
+          <a:p>
+            <a:pPr algn="ctr"/>
+            <a:r>
+              <a:rPr lang="es-ES" sz="1100" dirty="0" smtClean="0"/>
+              <a:t>$ 0,00</a:t>
+            </a:r>
+            <a:endParaRPr lang="es-ES" sz="1100" dirty="0"/>
+          </a:p>
+        </p:txBody>
+      </p:sp>
+      <p:sp>
+        <p:nvSpPr>
+          <p:cNvPr id="65" name="Rectángulo 64"/>
+          <p:cNvSpPr/>
+          <p:nvPr/>
+        </p:nvSpPr>
+        <p:spPr>
+          <a:xfrm>
+            <a:off x="8176603" y="1547620"/>
+            <a:ext cx="1515600" cy="227590"/>
+          </a:xfrm>
+          <a:prstGeom prst="rect">
+            <a:avLst/>
+          </a:prstGeom>
+        </p:spPr>
+        <p:style>
+          <a:lnRef idx="2">
+            <a:schemeClr val="dk1"/>
+          </a:lnRef>
+          <a:fillRef idx="1">
+            <a:schemeClr val="lt1"/>
+          </a:fillRef>
+          <a:effectRef idx="0">
+            <a:schemeClr val="dk1"/>
+          </a:effectRef>
+          <a:fontRef idx="minor">
+            <a:schemeClr val="dk1"/>
+          </a:fontRef>
+        </p:style>
+        <p:txBody>
+          <a:bodyPr rtlCol="0" anchor="ctr"/>
+          <a:lstStyle/>
+          <a:p>
+            <a:pPr algn="ctr"/>
+            <a:r>
+              <a:rPr lang="es-ES" sz="1200" dirty="0" smtClean="0">
+                <a:solidFill>
+                  <a:schemeClr val="dk1"/>
+                </a:solidFill>
+              </a:rPr>
+              <a:t>Imagen</a:t>
+            </a:r>
+            <a:endParaRPr lang="es-ES" sz="1200" dirty="0">
+              <a:solidFill>
+                <a:schemeClr val="dk1"/>
+              </a:solidFill>
+            </a:endParaRPr>
+          </a:p>
+        </p:txBody>
+      </p:sp>
+      <p:sp>
+        <p:nvSpPr>
+          <p:cNvPr id="67" name="Rectángulo 66"/>
+          <p:cNvSpPr/>
+          <p:nvPr/>
+        </p:nvSpPr>
+        <p:spPr>
+          <a:xfrm>
+            <a:off x="9688670" y="1547620"/>
+            <a:ext cx="1515600" cy="227590"/>
+          </a:xfrm>
+          <a:prstGeom prst="rect">
+            <a:avLst/>
+          </a:prstGeom>
+        </p:spPr>
+        <p:style>
+          <a:lnRef idx="2">
+            <a:schemeClr val="dk1"/>
+          </a:lnRef>
+          <a:fillRef idx="1">
+            <a:schemeClr val="lt1"/>
+          </a:fillRef>
+          <a:effectRef idx="0">
+            <a:schemeClr val="dk1"/>
+          </a:effectRef>
+          <a:fontRef idx="minor">
+            <a:schemeClr val="dk1"/>
+          </a:fontRef>
+        </p:style>
+        <p:txBody>
+          <a:bodyPr rtlCol="0" anchor="ctr"/>
+          <a:lstStyle/>
+          <a:p>
+            <a:pPr algn="ctr"/>
+            <a:r>
+              <a:rPr lang="es-ES" sz="1200" dirty="0" smtClean="0">
+                <a:solidFill>
+                  <a:schemeClr val="dk1"/>
+                </a:solidFill>
+              </a:rPr>
+              <a:t>Imagen</a:t>
+            </a:r>
+            <a:endParaRPr lang="es-ES" dirty="0">
+              <a:solidFill>
+                <a:schemeClr val="dk1"/>
+              </a:solidFill>
+            </a:endParaRPr>
+          </a:p>
+        </p:txBody>
+      </p:sp>
+      <p:sp>
+        <p:nvSpPr>
+          <p:cNvPr id="69" name="Rectángulo 68"/>
+          <p:cNvSpPr/>
+          <p:nvPr/>
+        </p:nvSpPr>
+        <p:spPr>
+          <a:xfrm>
+            <a:off x="9690438" y="1774481"/>
+            <a:ext cx="1512063" cy="597349"/>
+          </a:xfrm>
+          <a:prstGeom prst="rect">
+            <a:avLst/>
+          </a:prstGeom>
+          <a:solidFill>
+            <a:schemeClr val="bg1">
+              <a:lumMod val="85000"/>
+              <a:alpha val="28000"/>
+            </a:schemeClr>
+          </a:solidFill>
+        </p:spPr>
+        <p:style>
+          <a:lnRef idx="1">
+            <a:schemeClr val="accent3"/>
+          </a:lnRef>
+          <a:fillRef idx="2">
+            <a:schemeClr val="accent3"/>
+          </a:fillRef>
+          <a:effectRef idx="1">
+            <a:schemeClr val="accent3"/>
+          </a:effectRef>
+          <a:fontRef idx="minor">
+            <a:schemeClr val="dk1"/>
+          </a:fontRef>
+        </p:style>
+        <p:txBody>
+          <a:bodyPr rtlCol="0" anchor="ctr"/>
+          <a:lstStyle/>
+          <a:p>
+            <a:pPr algn="ctr"/>
+            <a:r>
+              <a:rPr lang="es-ES" sz="1400" dirty="0" smtClean="0"/>
+              <a:t>Nombre del Articulo</a:t>
+            </a:r>
+          </a:p>
+          <a:p>
+            <a:pPr algn="ctr"/>
+            <a:r>
+              <a:rPr lang="es-ES" sz="1100" dirty="0" smtClean="0"/>
+              <a:t>$ 0,00</a:t>
+            </a:r>
+            <a:endParaRPr lang="es-ES" sz="1100" dirty="0"/>
           </a:p>
         </p:txBody>
       </p:sp>
@@ -4855,8 +5434,8 @@
         </p:nvSpPr>
         <p:spPr>
           <a:xfrm>
-            <a:off x="2390004" y="2922604"/>
-            <a:ext cx="3000659" cy="1910619"/>
+            <a:off x="2390004" y="3095710"/>
+            <a:ext cx="3000659" cy="1737513"/>
           </a:xfrm>
           <a:prstGeom prst="rect">
             <a:avLst/>
@@ -4898,19 +5477,21 @@
                   <a:schemeClr val="dk1"/>
                 </a:solidFill>
               </a:rPr>
-              <a:t>80% del ancho total</a:t>
-            </a:r>
-          </a:p>
-          <a:p>
-            <a:pPr algn="ctr"/>
-            <a:r>
-              <a:rPr lang="es-ES" dirty="0">
+              <a:t>80% del ancho </a:t>
+            </a:r>
+            <a:r>
+              <a:rPr lang="es-ES" dirty="0" smtClean="0">
                 <a:solidFill>
                   <a:schemeClr val="dk1"/>
                 </a:solidFill>
               </a:rPr>
-              <a:t>34% del alto total</a:t>
-            </a:r>
+              <a:t>total</a:t>
+            </a:r>
+            <a:endParaRPr lang="es-ES" dirty="0">
+              <a:solidFill>
+                <a:schemeClr val="dk1"/>
+              </a:solidFill>
+            </a:endParaRPr>
           </a:p>
         </p:txBody>
       </p:sp>
@@ -5839,6 +6420,52 @@
               <a:t>Newsletter</a:t>
             </a:r>
             <a:endParaRPr lang="es-ES" sz="1600" dirty="0"/>
+          </a:p>
+        </p:txBody>
+      </p:sp>
+      <p:sp>
+        <p:nvSpPr>
+          <p:cNvPr id="35" name="CuadroTexto 34"/>
+          <p:cNvSpPr txBox="1"/>
+          <p:nvPr/>
+        </p:nvSpPr>
+        <p:spPr>
+          <a:xfrm>
+            <a:off x="2297473" y="2792614"/>
+            <a:ext cx="3000660" cy="276999"/>
+          </a:xfrm>
+          <a:prstGeom prst="rect">
+            <a:avLst/>
+          </a:prstGeom>
+          <a:noFill/>
+        </p:spPr>
+        <p:txBody>
+          <a:bodyPr wrap="square" rtlCol="0">
+            <a:spAutoFit/>
+          </a:bodyPr>
+          <a:lstStyle/>
+          <a:p>
+            <a:r>
+              <a:rPr lang="es-ES" sz="1200" dirty="0" err="1" smtClean="0"/>
+              <a:t>Categoria</a:t>
+            </a:r>
+            <a:r>
+              <a:rPr lang="es-ES" sz="1200" dirty="0" smtClean="0"/>
+              <a:t> </a:t>
+            </a:r>
+            <a:r>
+              <a:rPr lang="es-ES" sz="1200" dirty="0" smtClean="0">
+                <a:sym typeface="Wingdings" panose="05000000000000000000" pitchFamily="2" charset="2"/>
+              </a:rPr>
+              <a:t> </a:t>
+            </a:r>
+            <a:r>
+              <a:rPr lang="es-ES" sz="1200" dirty="0" err="1" smtClean="0">
+                <a:sym typeface="Wingdings" panose="05000000000000000000" pitchFamily="2" charset="2"/>
+              </a:rPr>
+              <a:t>Subcategoria</a:t>
+            </a:r>
+            <a:endParaRPr lang="es-ES" sz="1200" dirty="0"/>
           </a:p>
         </p:txBody>
       </p:sp>

</xml_diff>